<commit_message>
feat: add SPS30 sensor integration for particulate matter readings
</commit_message>
<xml_diff>
--- a/images/electrical-connection-scheme.pptx
+++ b/images/electrical-connection-scheme.pptx
@@ -6,6 +6,7 @@
   </p:sldMasterIdLst>
   <p:sldIdLst>
     <p:sldId id="257" r:id="rId2"/>
+    <p:sldId id="258" r:id="rId3"/>
   </p:sldIdLst>
   <p:sldSz cx="12192000" cy="6858000"/>
   <p:notesSz cx="6858000" cy="9144000"/>
@@ -261,7 +262,7 @@
           <a:p>
             <a:fld id="{8B92C507-D594-E044-90FE-0098317E28BC}" type="datetimeFigureOut">
               <a:rPr lang="en-BE" smtClean="0"/>
-              <a:t>05/01/2022</a:t>
+              <a:t>10/29/25</a:t>
             </a:fld>
             <a:endParaRPr lang="en-BE"/>
           </a:p>
@@ -461,7 +462,7 @@
           <a:p>
             <a:fld id="{8B92C507-D594-E044-90FE-0098317E28BC}" type="datetimeFigureOut">
               <a:rPr lang="en-BE" smtClean="0"/>
-              <a:t>05/01/2022</a:t>
+              <a:t>10/29/25</a:t>
             </a:fld>
             <a:endParaRPr lang="en-BE"/>
           </a:p>
@@ -671,7 +672,7 @@
           <a:p>
             <a:fld id="{8B92C507-D594-E044-90FE-0098317E28BC}" type="datetimeFigureOut">
               <a:rPr lang="en-BE" smtClean="0"/>
-              <a:t>05/01/2022</a:t>
+              <a:t>10/29/25</a:t>
             </a:fld>
             <a:endParaRPr lang="en-BE"/>
           </a:p>
@@ -871,7 +872,7 @@
           <a:p>
             <a:fld id="{8B92C507-D594-E044-90FE-0098317E28BC}" type="datetimeFigureOut">
               <a:rPr lang="en-BE" smtClean="0"/>
-              <a:t>05/01/2022</a:t>
+              <a:t>10/29/25</a:t>
             </a:fld>
             <a:endParaRPr lang="en-BE"/>
           </a:p>
@@ -1147,7 +1148,7 @@
           <a:p>
             <a:fld id="{8B92C507-D594-E044-90FE-0098317E28BC}" type="datetimeFigureOut">
               <a:rPr lang="en-BE" smtClean="0"/>
-              <a:t>05/01/2022</a:t>
+              <a:t>10/29/25</a:t>
             </a:fld>
             <a:endParaRPr lang="en-BE"/>
           </a:p>
@@ -1415,7 +1416,7 @@
           <a:p>
             <a:fld id="{8B92C507-D594-E044-90FE-0098317E28BC}" type="datetimeFigureOut">
               <a:rPr lang="en-BE" smtClean="0"/>
-              <a:t>05/01/2022</a:t>
+              <a:t>10/29/25</a:t>
             </a:fld>
             <a:endParaRPr lang="en-BE"/>
           </a:p>
@@ -1830,7 +1831,7 @@
           <a:p>
             <a:fld id="{8B92C507-D594-E044-90FE-0098317E28BC}" type="datetimeFigureOut">
               <a:rPr lang="en-BE" smtClean="0"/>
-              <a:t>05/01/2022</a:t>
+              <a:t>10/29/25</a:t>
             </a:fld>
             <a:endParaRPr lang="en-BE"/>
           </a:p>
@@ -1972,7 +1973,7 @@
           <a:p>
             <a:fld id="{8B92C507-D594-E044-90FE-0098317E28BC}" type="datetimeFigureOut">
               <a:rPr lang="en-BE" smtClean="0"/>
-              <a:t>05/01/2022</a:t>
+              <a:t>10/29/25</a:t>
             </a:fld>
             <a:endParaRPr lang="en-BE"/>
           </a:p>
@@ -2085,7 +2086,7 @@
           <a:p>
             <a:fld id="{8B92C507-D594-E044-90FE-0098317E28BC}" type="datetimeFigureOut">
               <a:rPr lang="en-BE" smtClean="0"/>
-              <a:t>05/01/2022</a:t>
+              <a:t>10/29/25</a:t>
             </a:fld>
             <a:endParaRPr lang="en-BE"/>
           </a:p>
@@ -2398,7 +2399,7 @@
           <a:p>
             <a:fld id="{8B92C507-D594-E044-90FE-0098317E28BC}" type="datetimeFigureOut">
               <a:rPr lang="en-BE" smtClean="0"/>
-              <a:t>05/01/2022</a:t>
+              <a:t>10/29/25</a:t>
             </a:fld>
             <a:endParaRPr lang="en-BE"/>
           </a:p>
@@ -2687,7 +2688,7 @@
           <a:p>
             <a:fld id="{8B92C507-D594-E044-90FE-0098317E28BC}" type="datetimeFigureOut">
               <a:rPr lang="en-BE" smtClean="0"/>
-              <a:t>05/01/2022</a:t>
+              <a:t>10/29/25</a:t>
             </a:fld>
             <a:endParaRPr lang="en-BE"/>
           </a:p>
@@ -2930,7 +2931,7 @@
           <a:p>
             <a:fld id="{8B92C507-D594-E044-90FE-0098317E28BC}" type="datetimeFigureOut">
               <a:rPr lang="en-BE" smtClean="0"/>
-              <a:t>05/01/2022</a:t>
+              <a:t>10/29/25</a:t>
             </a:fld>
             <a:endParaRPr lang="en-BE"/>
           </a:p>
@@ -4630,6 +4631,2031 @@
 </p:sld>
 </file>
 
+<file path=ppt/slides/slide2.xml><?xml version="1.0" encoding="utf-8"?>
+<p:sld xmlns:a="http://schemas.openxmlformats.org/drawingml/2006/main" xmlns:r="http://schemas.openxmlformats.org/officeDocument/2006/relationships" xmlns:p="http://schemas.openxmlformats.org/presentationml/2006/main">
+  <p:cSld>
+    <p:spTree>
+      <p:nvGrpSpPr>
+        <p:cNvPr id="1" name="">
+          <a:extLst>
+            <a:ext uri="{FF2B5EF4-FFF2-40B4-BE49-F238E27FC236}">
+              <a16:creationId xmlns:a16="http://schemas.microsoft.com/office/drawing/2014/main" id="{AB19D771-B9BB-BC83-C763-92E2BDF405EB}"/>
+            </a:ext>
+          </a:extLst>
+        </p:cNvPr>
+        <p:cNvGrpSpPr/>
+        <p:nvPr/>
+      </p:nvGrpSpPr>
+      <p:grpSpPr>
+        <a:xfrm>
+          <a:off x="0" y="0"/>
+          <a:ext cx="0" cy="0"/>
+          <a:chOff x="0" y="0"/>
+          <a:chExt cx="0" cy="0"/>
+        </a:xfrm>
+      </p:grpSpPr>
+      <p:pic>
+        <p:nvPicPr>
+          <p:cNvPr id="1028" name="Picture 4">
+            <a:extLst>
+              <a:ext uri="{FF2B5EF4-FFF2-40B4-BE49-F238E27FC236}">
+                <a16:creationId xmlns:a16="http://schemas.microsoft.com/office/drawing/2014/main" id="{1174B074-8590-7D1A-9BDB-4644EEF7B21B}"/>
+              </a:ext>
+            </a:extLst>
+          </p:cNvPr>
+          <p:cNvPicPr>
+            <a:picLocks noChangeAspect="1" noChangeArrowheads="1"/>
+          </p:cNvPicPr>
+          <p:nvPr/>
+        </p:nvPicPr>
+        <p:blipFill rotWithShape="1">
+          <a:blip r:embed="rId2">
+            <a:extLst>
+              <a:ext uri="{BEBA8EAE-BF5A-486C-A8C5-ECC9F3942E4B}">
+                <a14:imgProps xmlns:a14="http://schemas.microsoft.com/office/drawing/2010/main">
+                  <a14:imgLayer r:embed="rId3">
+                    <a14:imgEffect>
+                      <a14:saturation sat="0"/>
+                    </a14:imgEffect>
+                  </a14:imgLayer>
+                </a14:imgProps>
+              </a:ext>
+              <a:ext uri="{28A0092B-C50C-407E-A947-70E740481C1C}">
+                <a14:useLocalDpi xmlns:a14="http://schemas.microsoft.com/office/drawing/2010/main" val="0"/>
+              </a:ext>
+            </a:extLst>
+          </a:blip>
+          <a:srcRect r="1683"/>
+          <a:stretch/>
+        </p:blipFill>
+        <p:spPr bwMode="auto">
+          <a:xfrm rot="5400000">
+            <a:off x="-1085273" y="1200723"/>
+            <a:ext cx="6742548" cy="4572001"/>
+          </a:xfrm>
+          <a:prstGeom prst="rect">
+            <a:avLst/>
+          </a:prstGeom>
+          <a:noFill/>
+          <a:extLst>
+            <a:ext uri="{909E8E84-426E-40DD-AFC4-6F175D3DCCD1}">
+              <a14:hiddenFill xmlns:a14="http://schemas.microsoft.com/office/drawing/2010/main">
+                <a:solidFill>
+                  <a:srgbClr val="FFFFFF"/>
+                </a:solidFill>
+              </a14:hiddenFill>
+            </a:ext>
+          </a:extLst>
+        </p:spPr>
+      </p:pic>
+      <p:sp>
+        <p:nvSpPr>
+          <p:cNvPr id="4" name="Rectangle 3">
+            <a:extLst>
+              <a:ext uri="{FF2B5EF4-FFF2-40B4-BE49-F238E27FC236}">
+                <a16:creationId xmlns:a16="http://schemas.microsoft.com/office/drawing/2014/main" id="{8B61F5F6-7A9B-11C7-55FD-B7CF52F6DAE8}"/>
+              </a:ext>
+            </a:extLst>
+          </p:cNvPr>
+          <p:cNvSpPr/>
+          <p:nvPr/>
+        </p:nvSpPr>
+        <p:spPr>
+          <a:xfrm>
+            <a:off x="5044759" y="51320"/>
+            <a:ext cx="973343" cy="338554"/>
+          </a:xfrm>
+          <a:prstGeom prst="rect">
+            <a:avLst/>
+          </a:prstGeom>
+        </p:spPr>
+        <p:txBody>
+          <a:bodyPr wrap="none">
+            <a:spAutoFit/>
+          </a:bodyPr>
+          <a:lstStyle/>
+          <a:p>
+            <a:r>
+              <a:rPr lang="en-GB" sz="1600" b="1" dirty="0">
+                <a:solidFill>
+                  <a:schemeClr val="accent1"/>
+                </a:solidFill>
+                <a:latin typeface="Montserrat" pitchFamily="2" charset="77"/>
+              </a:rPr>
+              <a:t>MH-Z19</a:t>
+            </a:r>
+            <a:endParaRPr lang="en-BE" sz="1600" b="1" dirty="0">
+              <a:solidFill>
+                <a:schemeClr val="accent1"/>
+              </a:solidFill>
+              <a:latin typeface="Montserrat" pitchFamily="2" charset="77"/>
+            </a:endParaRPr>
+          </a:p>
+        </p:txBody>
+      </p:sp>
+      <p:pic>
+        <p:nvPicPr>
+          <p:cNvPr id="1032" name="Picture 8">
+            <a:extLst>
+              <a:ext uri="{FF2B5EF4-FFF2-40B4-BE49-F238E27FC236}">
+                <a16:creationId xmlns:a16="http://schemas.microsoft.com/office/drawing/2014/main" id="{BBBA5047-5099-EF32-2B9B-EA84AFE7F3CD}"/>
+              </a:ext>
+            </a:extLst>
+          </p:cNvPr>
+          <p:cNvPicPr>
+            <a:picLocks noChangeAspect="1" noChangeArrowheads="1"/>
+          </p:cNvPicPr>
+          <p:nvPr/>
+        </p:nvPicPr>
+        <p:blipFill rotWithShape="1">
+          <a:blip r:embed="rId4">
+            <a:extLst>
+              <a:ext uri="{28A0092B-C50C-407E-A947-70E740481C1C}">
+                <a14:useLocalDpi xmlns:a14="http://schemas.microsoft.com/office/drawing/2010/main" val="0"/>
+              </a:ext>
+            </a:extLst>
+          </a:blip>
+          <a:srcRect t="20254" r="2555"/>
+          <a:stretch/>
+        </p:blipFill>
+        <p:spPr bwMode="auto">
+          <a:xfrm rot="5400000">
+            <a:off x="3042830" y="3306066"/>
+            <a:ext cx="4401999" cy="2701870"/>
+          </a:xfrm>
+          <a:prstGeom prst="rect">
+            <a:avLst/>
+          </a:prstGeom>
+          <a:noFill/>
+          <a:extLst>
+            <a:ext uri="{909E8E84-426E-40DD-AFC4-6F175D3DCCD1}">
+              <a14:hiddenFill xmlns:a14="http://schemas.microsoft.com/office/drawing/2010/main">
+                <a:solidFill>
+                  <a:srgbClr val="FFFFFF"/>
+                </a:solidFill>
+              </a14:hiddenFill>
+            </a:ext>
+          </a:extLst>
+        </p:spPr>
+      </p:pic>
+      <p:sp>
+        <p:nvSpPr>
+          <p:cNvPr id="10" name="Rectangle 9">
+            <a:extLst>
+              <a:ext uri="{FF2B5EF4-FFF2-40B4-BE49-F238E27FC236}">
+                <a16:creationId xmlns:a16="http://schemas.microsoft.com/office/drawing/2014/main" id="{73BB9105-3B01-BD1F-A38E-77417DB5F7B2}"/>
+              </a:ext>
+            </a:extLst>
+          </p:cNvPr>
+          <p:cNvSpPr/>
+          <p:nvPr/>
+        </p:nvSpPr>
+        <p:spPr>
+          <a:xfrm>
+            <a:off x="6594765" y="4442406"/>
+            <a:ext cx="1074333" cy="338554"/>
+          </a:xfrm>
+          <a:prstGeom prst="rect">
+            <a:avLst/>
+          </a:prstGeom>
+        </p:spPr>
+        <p:txBody>
+          <a:bodyPr wrap="none">
+            <a:spAutoFit/>
+          </a:bodyPr>
+          <a:lstStyle/>
+          <a:p>
+            <a:r>
+              <a:rPr lang="en-GB" sz="1600" b="1" dirty="0">
+                <a:solidFill>
+                  <a:schemeClr val="accent1"/>
+                </a:solidFill>
+                <a:latin typeface="Montserrat" pitchFamily="2" charset="77"/>
+              </a:rPr>
+              <a:t>VMA342</a:t>
+            </a:r>
+            <a:endParaRPr lang="en-BE" sz="1600" b="1" dirty="0">
+              <a:solidFill>
+                <a:schemeClr val="accent1"/>
+              </a:solidFill>
+              <a:latin typeface="Montserrat" pitchFamily="2" charset="77"/>
+            </a:endParaRPr>
+          </a:p>
+        </p:txBody>
+      </p:sp>
+      <p:sp>
+        <p:nvSpPr>
+          <p:cNvPr id="7" name="Freeform 6">
+            <a:extLst>
+              <a:ext uri="{FF2B5EF4-FFF2-40B4-BE49-F238E27FC236}">
+                <a16:creationId xmlns:a16="http://schemas.microsoft.com/office/drawing/2014/main" id="{6F1CA18B-B43C-B2C0-98BA-D36BB629243C}"/>
+              </a:ext>
+            </a:extLst>
+          </p:cNvPr>
+          <p:cNvSpPr/>
+          <p:nvPr/>
+        </p:nvSpPr>
+        <p:spPr>
+          <a:xfrm>
+            <a:off x="2382983" y="614213"/>
+            <a:ext cx="1847274" cy="3537527"/>
+          </a:xfrm>
+          <a:custGeom>
+            <a:avLst/>
+            <a:gdLst>
+              <a:gd name="connsiteX0" fmla="*/ 3805381 w 3805381"/>
+              <a:gd name="connsiteY0" fmla="*/ 5080000 h 5080000"/>
+              <a:gd name="connsiteX1" fmla="*/ 0 w 3805381"/>
+              <a:gd name="connsiteY1" fmla="*/ 5080000 h 5080000"/>
+              <a:gd name="connsiteX2" fmla="*/ 0 w 3805381"/>
+              <a:gd name="connsiteY2" fmla="*/ 0 h 5080000"/>
+              <a:gd name="connsiteX3" fmla="*/ 147781 w 3805381"/>
+              <a:gd name="connsiteY3" fmla="*/ 0 h 5080000"/>
+              <a:gd name="connsiteX4" fmla="*/ 277091 w 3805381"/>
+              <a:gd name="connsiteY4" fmla="*/ 0 h 5080000"/>
+            </a:gdLst>
+            <a:ahLst/>
+            <a:cxnLst>
+              <a:cxn ang="0">
+                <a:pos x="connsiteX0" y="connsiteY0"/>
+              </a:cxn>
+              <a:cxn ang="0">
+                <a:pos x="connsiteX1" y="connsiteY1"/>
+              </a:cxn>
+              <a:cxn ang="0">
+                <a:pos x="connsiteX2" y="connsiteY2"/>
+              </a:cxn>
+              <a:cxn ang="0">
+                <a:pos x="connsiteX3" y="connsiteY3"/>
+              </a:cxn>
+              <a:cxn ang="0">
+                <a:pos x="connsiteX4" y="connsiteY4"/>
+              </a:cxn>
+            </a:cxnLst>
+            <a:rect l="l" t="t" r="r" b="b"/>
+            <a:pathLst>
+              <a:path w="3805381" h="5080000">
+                <a:moveTo>
+                  <a:pt x="3805381" y="5080000"/>
+                </a:moveTo>
+                <a:lnTo>
+                  <a:pt x="0" y="5080000"/>
+                </a:lnTo>
+                <a:lnTo>
+                  <a:pt x="0" y="0"/>
+                </a:lnTo>
+                <a:lnTo>
+                  <a:pt x="147781" y="0"/>
+                </a:lnTo>
+                <a:lnTo>
+                  <a:pt x="277091" y="0"/>
+                </a:lnTo>
+              </a:path>
+            </a:pathLst>
+          </a:custGeom>
+          <a:noFill/>
+          <a:ln w="76200">
+            <a:solidFill>
+              <a:srgbClr val="FF0000"/>
+            </a:solidFill>
+          </a:ln>
+        </p:spPr>
+        <p:style>
+          <a:lnRef idx="2">
+            <a:schemeClr val="accent1">
+              <a:shade val="50000"/>
+            </a:schemeClr>
+          </a:lnRef>
+          <a:fillRef idx="1">
+            <a:schemeClr val="accent1"/>
+          </a:fillRef>
+          <a:effectRef idx="0">
+            <a:schemeClr val="accent1"/>
+          </a:effectRef>
+          <a:fontRef idx="minor">
+            <a:schemeClr val="lt1"/>
+          </a:fontRef>
+        </p:style>
+        <p:txBody>
+          <a:bodyPr rtlCol="0" anchor="ctr"/>
+          <a:lstStyle/>
+          <a:p>
+            <a:pPr algn="ctr"/>
+            <a:endParaRPr lang="en-BE"/>
+          </a:p>
+        </p:txBody>
+      </p:sp>
+      <p:sp>
+        <p:nvSpPr>
+          <p:cNvPr id="14" name="Freeform 13">
+            <a:extLst>
+              <a:ext uri="{FF2B5EF4-FFF2-40B4-BE49-F238E27FC236}">
+                <a16:creationId xmlns:a16="http://schemas.microsoft.com/office/drawing/2014/main" id="{468C4A68-CEB9-12A4-5B9B-A0426D5EB186}"/>
+              </a:ext>
+            </a:extLst>
+          </p:cNvPr>
+          <p:cNvSpPr/>
+          <p:nvPr/>
+        </p:nvSpPr>
+        <p:spPr>
+          <a:xfrm>
+            <a:off x="2244437" y="1842649"/>
+            <a:ext cx="1967346" cy="2521527"/>
+          </a:xfrm>
+          <a:custGeom>
+            <a:avLst/>
+            <a:gdLst>
+              <a:gd name="connsiteX0" fmla="*/ 1967346 w 1967346"/>
+              <a:gd name="connsiteY0" fmla="*/ 2807855 h 2807855"/>
+              <a:gd name="connsiteX1" fmla="*/ 0 w 1967346"/>
+              <a:gd name="connsiteY1" fmla="*/ 2807855 h 2807855"/>
+              <a:gd name="connsiteX2" fmla="*/ 0 w 1967346"/>
+              <a:gd name="connsiteY2" fmla="*/ 0 h 2807855"/>
+              <a:gd name="connsiteX3" fmla="*/ 157019 w 1967346"/>
+              <a:gd name="connsiteY3" fmla="*/ 0 h 2807855"/>
+              <a:gd name="connsiteX4" fmla="*/ 350982 w 1967346"/>
+              <a:gd name="connsiteY4" fmla="*/ 0 h 2807855"/>
+            </a:gdLst>
+            <a:ahLst/>
+            <a:cxnLst>
+              <a:cxn ang="0">
+                <a:pos x="connsiteX0" y="connsiteY0"/>
+              </a:cxn>
+              <a:cxn ang="0">
+                <a:pos x="connsiteX1" y="connsiteY1"/>
+              </a:cxn>
+              <a:cxn ang="0">
+                <a:pos x="connsiteX2" y="connsiteY2"/>
+              </a:cxn>
+              <a:cxn ang="0">
+                <a:pos x="connsiteX3" y="connsiteY3"/>
+              </a:cxn>
+              <a:cxn ang="0">
+                <a:pos x="connsiteX4" y="connsiteY4"/>
+              </a:cxn>
+            </a:cxnLst>
+            <a:rect l="l" t="t" r="r" b="b"/>
+            <a:pathLst>
+              <a:path w="1967346" h="2807855">
+                <a:moveTo>
+                  <a:pt x="1967346" y="2807855"/>
+                </a:moveTo>
+                <a:lnTo>
+                  <a:pt x="0" y="2807855"/>
+                </a:lnTo>
+                <a:lnTo>
+                  <a:pt x="0" y="0"/>
+                </a:lnTo>
+                <a:lnTo>
+                  <a:pt x="157019" y="0"/>
+                </a:lnTo>
+                <a:lnTo>
+                  <a:pt x="350982" y="0"/>
+                </a:lnTo>
+              </a:path>
+            </a:pathLst>
+          </a:custGeom>
+          <a:noFill/>
+          <a:ln w="76200">
+            <a:solidFill>
+              <a:schemeClr val="tx1"/>
+            </a:solidFill>
+          </a:ln>
+        </p:spPr>
+        <p:style>
+          <a:lnRef idx="2">
+            <a:schemeClr val="accent1">
+              <a:shade val="50000"/>
+            </a:schemeClr>
+          </a:lnRef>
+          <a:fillRef idx="1">
+            <a:schemeClr val="accent1"/>
+          </a:fillRef>
+          <a:effectRef idx="0">
+            <a:schemeClr val="accent1"/>
+          </a:effectRef>
+          <a:fontRef idx="minor">
+            <a:schemeClr val="lt1"/>
+          </a:fontRef>
+        </p:style>
+        <p:txBody>
+          <a:bodyPr rtlCol="0" anchor="ctr"/>
+          <a:lstStyle/>
+          <a:p>
+            <a:pPr algn="ctr"/>
+            <a:endParaRPr lang="en-BE"/>
+          </a:p>
+        </p:txBody>
+      </p:sp>
+      <p:sp>
+        <p:nvSpPr>
+          <p:cNvPr id="15" name="Freeform 14">
+            <a:extLst>
+              <a:ext uri="{FF2B5EF4-FFF2-40B4-BE49-F238E27FC236}">
+                <a16:creationId xmlns:a16="http://schemas.microsoft.com/office/drawing/2014/main" id="{6BC6DC4E-594A-9109-E37A-55802DEC384F}"/>
+              </a:ext>
+            </a:extLst>
+          </p:cNvPr>
+          <p:cNvSpPr/>
+          <p:nvPr/>
+        </p:nvSpPr>
+        <p:spPr>
+          <a:xfrm>
+            <a:off x="2115128" y="909776"/>
+            <a:ext cx="2096655" cy="3639128"/>
+          </a:xfrm>
+          <a:custGeom>
+            <a:avLst/>
+            <a:gdLst>
+              <a:gd name="connsiteX0" fmla="*/ 2096655 w 2096655"/>
+              <a:gd name="connsiteY0" fmla="*/ 3639128 h 3639128"/>
+              <a:gd name="connsiteX1" fmla="*/ 0 w 2096655"/>
+              <a:gd name="connsiteY1" fmla="*/ 3639128 h 3639128"/>
+              <a:gd name="connsiteX2" fmla="*/ 0 w 2096655"/>
+              <a:gd name="connsiteY2" fmla="*/ 0 h 3639128"/>
+              <a:gd name="connsiteX3" fmla="*/ 110837 w 2096655"/>
+              <a:gd name="connsiteY3" fmla="*/ 0 h 3639128"/>
+              <a:gd name="connsiteX4" fmla="*/ 461818 w 2096655"/>
+              <a:gd name="connsiteY4" fmla="*/ 0 h 3639128"/>
+            </a:gdLst>
+            <a:ahLst/>
+            <a:cxnLst>
+              <a:cxn ang="0">
+                <a:pos x="connsiteX0" y="connsiteY0"/>
+              </a:cxn>
+              <a:cxn ang="0">
+                <a:pos x="connsiteX1" y="connsiteY1"/>
+              </a:cxn>
+              <a:cxn ang="0">
+                <a:pos x="connsiteX2" y="connsiteY2"/>
+              </a:cxn>
+              <a:cxn ang="0">
+                <a:pos x="connsiteX3" y="connsiteY3"/>
+              </a:cxn>
+              <a:cxn ang="0">
+                <a:pos x="connsiteX4" y="connsiteY4"/>
+              </a:cxn>
+            </a:cxnLst>
+            <a:rect l="l" t="t" r="r" b="b"/>
+            <a:pathLst>
+              <a:path w="2096655" h="3639128">
+                <a:moveTo>
+                  <a:pt x="2096655" y="3639128"/>
+                </a:moveTo>
+                <a:lnTo>
+                  <a:pt x="0" y="3639128"/>
+                </a:lnTo>
+                <a:lnTo>
+                  <a:pt x="0" y="0"/>
+                </a:lnTo>
+                <a:lnTo>
+                  <a:pt x="110837" y="0"/>
+                </a:lnTo>
+                <a:lnTo>
+                  <a:pt x="461818" y="0"/>
+                </a:lnTo>
+              </a:path>
+            </a:pathLst>
+          </a:custGeom>
+          <a:noFill/>
+          <a:ln w="76200">
+            <a:solidFill>
+              <a:srgbClr val="00B050"/>
+            </a:solidFill>
+          </a:ln>
+        </p:spPr>
+        <p:style>
+          <a:lnRef idx="2">
+            <a:schemeClr val="accent1">
+              <a:shade val="50000"/>
+            </a:schemeClr>
+          </a:lnRef>
+          <a:fillRef idx="1">
+            <a:schemeClr val="accent1"/>
+          </a:fillRef>
+          <a:effectRef idx="0">
+            <a:schemeClr val="accent1"/>
+          </a:effectRef>
+          <a:fontRef idx="minor">
+            <a:schemeClr val="lt1"/>
+          </a:fontRef>
+        </p:style>
+        <p:txBody>
+          <a:bodyPr rtlCol="0" anchor="ctr"/>
+          <a:lstStyle/>
+          <a:p>
+            <a:pPr algn="ctr"/>
+            <a:endParaRPr lang="en-BE"/>
+          </a:p>
+        </p:txBody>
+      </p:sp>
+      <p:sp>
+        <p:nvSpPr>
+          <p:cNvPr id="18" name="Freeform 17">
+            <a:extLst>
+              <a:ext uri="{FF2B5EF4-FFF2-40B4-BE49-F238E27FC236}">
+                <a16:creationId xmlns:a16="http://schemas.microsoft.com/office/drawing/2014/main" id="{6463BB75-23E9-36A7-B75E-E40B732EAA78}"/>
+              </a:ext>
+            </a:extLst>
+          </p:cNvPr>
+          <p:cNvSpPr/>
+          <p:nvPr/>
+        </p:nvSpPr>
+        <p:spPr>
+          <a:xfrm>
+            <a:off x="1976583" y="1223813"/>
+            <a:ext cx="2225963" cy="3528291"/>
+          </a:xfrm>
+          <a:custGeom>
+            <a:avLst/>
+            <a:gdLst>
+              <a:gd name="connsiteX0" fmla="*/ 2225963 w 2225963"/>
+              <a:gd name="connsiteY0" fmla="*/ 3528291 h 3528291"/>
+              <a:gd name="connsiteX1" fmla="*/ 0 w 2225963"/>
+              <a:gd name="connsiteY1" fmla="*/ 3528291 h 3528291"/>
+              <a:gd name="connsiteX2" fmla="*/ 0 w 2225963"/>
+              <a:gd name="connsiteY2" fmla="*/ 3408218 h 3528291"/>
+              <a:gd name="connsiteX3" fmla="*/ 0 w 2225963"/>
+              <a:gd name="connsiteY3" fmla="*/ 0 h 3528291"/>
+              <a:gd name="connsiteX4" fmla="*/ 508000 w 2225963"/>
+              <a:gd name="connsiteY4" fmla="*/ 0 h 3528291"/>
+              <a:gd name="connsiteX5" fmla="*/ 618836 w 2225963"/>
+              <a:gd name="connsiteY5" fmla="*/ 0 h 3528291"/>
+            </a:gdLst>
+            <a:ahLst/>
+            <a:cxnLst>
+              <a:cxn ang="0">
+                <a:pos x="connsiteX0" y="connsiteY0"/>
+              </a:cxn>
+              <a:cxn ang="0">
+                <a:pos x="connsiteX1" y="connsiteY1"/>
+              </a:cxn>
+              <a:cxn ang="0">
+                <a:pos x="connsiteX2" y="connsiteY2"/>
+              </a:cxn>
+              <a:cxn ang="0">
+                <a:pos x="connsiteX3" y="connsiteY3"/>
+              </a:cxn>
+              <a:cxn ang="0">
+                <a:pos x="connsiteX4" y="connsiteY4"/>
+              </a:cxn>
+              <a:cxn ang="0">
+                <a:pos x="connsiteX5" y="connsiteY5"/>
+              </a:cxn>
+            </a:cxnLst>
+            <a:rect l="l" t="t" r="r" b="b"/>
+            <a:pathLst>
+              <a:path w="2225963" h="3528291">
+                <a:moveTo>
+                  <a:pt x="2225963" y="3528291"/>
+                </a:moveTo>
+                <a:lnTo>
+                  <a:pt x="0" y="3528291"/>
+                </a:lnTo>
+                <a:lnTo>
+                  <a:pt x="0" y="3408218"/>
+                </a:lnTo>
+                <a:lnTo>
+                  <a:pt x="0" y="0"/>
+                </a:lnTo>
+                <a:lnTo>
+                  <a:pt x="508000" y="0"/>
+                </a:lnTo>
+                <a:lnTo>
+                  <a:pt x="618836" y="0"/>
+                </a:lnTo>
+              </a:path>
+            </a:pathLst>
+          </a:custGeom>
+          <a:noFill/>
+          <a:ln w="76200">
+            <a:solidFill>
+              <a:srgbClr val="00B0F0"/>
+            </a:solidFill>
+          </a:ln>
+        </p:spPr>
+        <p:style>
+          <a:lnRef idx="2">
+            <a:schemeClr val="accent1">
+              <a:shade val="50000"/>
+            </a:schemeClr>
+          </a:lnRef>
+          <a:fillRef idx="1">
+            <a:schemeClr val="accent1"/>
+          </a:fillRef>
+          <a:effectRef idx="0">
+            <a:schemeClr val="accent1"/>
+          </a:effectRef>
+          <a:fontRef idx="minor">
+            <a:schemeClr val="lt1"/>
+          </a:fontRef>
+        </p:style>
+        <p:txBody>
+          <a:bodyPr rtlCol="0" anchor="ctr"/>
+          <a:lstStyle/>
+          <a:p>
+            <a:pPr algn="ctr"/>
+            <a:endParaRPr lang="en-BE"/>
+          </a:p>
+        </p:txBody>
+      </p:sp>
+      <p:pic>
+        <p:nvPicPr>
+          <p:cNvPr id="1030" name="Picture 6" descr="MHZ19 Carbon Dioxide CO2 Sensor Module — PMD Way">
+            <a:extLst>
+              <a:ext uri="{FF2B5EF4-FFF2-40B4-BE49-F238E27FC236}">
+                <a16:creationId xmlns:a16="http://schemas.microsoft.com/office/drawing/2014/main" id="{10EE3581-D371-932E-C6A6-C07A23F84E30}"/>
+              </a:ext>
+            </a:extLst>
+          </p:cNvPr>
+          <p:cNvPicPr>
+            <a:picLocks noChangeAspect="1" noChangeArrowheads="1"/>
+          </p:cNvPicPr>
+          <p:nvPr/>
+        </p:nvPicPr>
+        <p:blipFill>
+          <a:blip r:embed="rId5">
+            <a:extLst>
+              <a:ext uri="{28A0092B-C50C-407E-A947-70E740481C1C}">
+                <a14:useLocalDpi xmlns:a14="http://schemas.microsoft.com/office/drawing/2010/main" val="0"/>
+              </a:ext>
+            </a:extLst>
+          </a:blip>
+          <a:srcRect/>
+          <a:stretch>
+            <a:fillRect/>
+          </a:stretch>
+        </p:blipFill>
+        <p:spPr bwMode="auto">
+          <a:xfrm>
+            <a:off x="4112139" y="636649"/>
+            <a:ext cx="3256057" cy="2116437"/>
+          </a:xfrm>
+          <a:prstGeom prst="rect">
+            <a:avLst/>
+          </a:prstGeom>
+          <a:noFill/>
+          <a:extLst>
+            <a:ext uri="{909E8E84-426E-40DD-AFC4-6F175D3DCCD1}">
+              <a14:hiddenFill xmlns:a14="http://schemas.microsoft.com/office/drawing/2010/main">
+                <a:solidFill>
+                  <a:srgbClr val="FFFFFF"/>
+                </a:solidFill>
+              </a14:hiddenFill>
+            </a:ext>
+          </a:extLst>
+        </p:spPr>
+      </p:pic>
+      <p:sp>
+        <p:nvSpPr>
+          <p:cNvPr id="19" name="Freeform 18">
+            <a:extLst>
+              <a:ext uri="{FF2B5EF4-FFF2-40B4-BE49-F238E27FC236}">
+                <a16:creationId xmlns:a16="http://schemas.microsoft.com/office/drawing/2014/main" id="{86E65B9F-81E9-059C-D96E-AE90C6D67CE4}"/>
+              </a:ext>
+            </a:extLst>
+          </p:cNvPr>
+          <p:cNvSpPr/>
+          <p:nvPr/>
+        </p:nvSpPr>
+        <p:spPr>
+          <a:xfrm>
+            <a:off x="3103419" y="1685631"/>
+            <a:ext cx="1283855" cy="184727"/>
+          </a:xfrm>
+          <a:custGeom>
+            <a:avLst/>
+            <a:gdLst>
+              <a:gd name="connsiteX0" fmla="*/ 1283855 w 1283855"/>
+              <a:gd name="connsiteY0" fmla="*/ 0 h 184727"/>
+              <a:gd name="connsiteX1" fmla="*/ 785091 w 1283855"/>
+              <a:gd name="connsiteY1" fmla="*/ 0 h 184727"/>
+              <a:gd name="connsiteX2" fmla="*/ 785091 w 1283855"/>
+              <a:gd name="connsiteY2" fmla="*/ 184727 h 184727"/>
+              <a:gd name="connsiteX3" fmla="*/ 0 w 1283855"/>
+              <a:gd name="connsiteY3" fmla="*/ 184727 h 184727"/>
+            </a:gdLst>
+            <a:ahLst/>
+            <a:cxnLst>
+              <a:cxn ang="0">
+                <a:pos x="connsiteX0" y="connsiteY0"/>
+              </a:cxn>
+              <a:cxn ang="0">
+                <a:pos x="connsiteX1" y="connsiteY1"/>
+              </a:cxn>
+              <a:cxn ang="0">
+                <a:pos x="connsiteX2" y="connsiteY2"/>
+              </a:cxn>
+              <a:cxn ang="0">
+                <a:pos x="connsiteX3" y="connsiteY3"/>
+              </a:cxn>
+            </a:cxnLst>
+            <a:rect l="l" t="t" r="r" b="b"/>
+            <a:pathLst>
+              <a:path w="1283855" h="184727">
+                <a:moveTo>
+                  <a:pt x="1283855" y="0"/>
+                </a:moveTo>
+                <a:lnTo>
+                  <a:pt x="785091" y="0"/>
+                </a:lnTo>
+                <a:lnTo>
+                  <a:pt x="785091" y="184727"/>
+                </a:lnTo>
+                <a:lnTo>
+                  <a:pt x="0" y="184727"/>
+                </a:lnTo>
+              </a:path>
+            </a:pathLst>
+          </a:custGeom>
+          <a:noFill/>
+          <a:ln w="76200">
+            <a:solidFill>
+              <a:srgbClr val="7030A0"/>
+            </a:solidFill>
+          </a:ln>
+        </p:spPr>
+        <p:style>
+          <a:lnRef idx="2">
+            <a:schemeClr val="accent1">
+              <a:shade val="50000"/>
+            </a:schemeClr>
+          </a:lnRef>
+          <a:fillRef idx="1">
+            <a:schemeClr val="accent1"/>
+          </a:fillRef>
+          <a:effectRef idx="0">
+            <a:schemeClr val="accent1"/>
+          </a:effectRef>
+          <a:fontRef idx="minor">
+            <a:schemeClr val="lt1"/>
+          </a:fontRef>
+        </p:style>
+        <p:txBody>
+          <a:bodyPr rtlCol="0" anchor="ctr"/>
+          <a:lstStyle/>
+          <a:p>
+            <a:pPr algn="ctr"/>
+            <a:endParaRPr lang="en-BE"/>
+          </a:p>
+        </p:txBody>
+      </p:sp>
+      <p:sp>
+        <p:nvSpPr>
+          <p:cNvPr id="20" name="Freeform 19">
+            <a:extLst>
+              <a:ext uri="{FF2B5EF4-FFF2-40B4-BE49-F238E27FC236}">
+                <a16:creationId xmlns:a16="http://schemas.microsoft.com/office/drawing/2014/main" id="{ED100ADD-71C7-32A3-F6D7-2F5AB7B7C7CB}"/>
+              </a:ext>
+            </a:extLst>
+          </p:cNvPr>
+          <p:cNvSpPr/>
+          <p:nvPr/>
+        </p:nvSpPr>
+        <p:spPr>
+          <a:xfrm>
+            <a:off x="3103419" y="1528613"/>
+            <a:ext cx="1283855" cy="387927"/>
+          </a:xfrm>
+          <a:custGeom>
+            <a:avLst/>
+            <a:gdLst>
+              <a:gd name="connsiteX0" fmla="*/ 1283855 w 1283855"/>
+              <a:gd name="connsiteY0" fmla="*/ 387927 h 387927"/>
+              <a:gd name="connsiteX1" fmla="*/ 923637 w 1283855"/>
+              <a:gd name="connsiteY1" fmla="*/ 387927 h 387927"/>
+              <a:gd name="connsiteX2" fmla="*/ 923637 w 1283855"/>
+              <a:gd name="connsiteY2" fmla="*/ 0 h 387927"/>
+              <a:gd name="connsiteX3" fmla="*/ 0 w 1283855"/>
+              <a:gd name="connsiteY3" fmla="*/ 0 h 387927"/>
+            </a:gdLst>
+            <a:ahLst/>
+            <a:cxnLst>
+              <a:cxn ang="0">
+                <a:pos x="connsiteX0" y="connsiteY0"/>
+              </a:cxn>
+              <a:cxn ang="0">
+                <a:pos x="connsiteX1" y="connsiteY1"/>
+              </a:cxn>
+              <a:cxn ang="0">
+                <a:pos x="connsiteX2" y="connsiteY2"/>
+              </a:cxn>
+              <a:cxn ang="0">
+                <a:pos x="connsiteX3" y="connsiteY3"/>
+              </a:cxn>
+            </a:cxnLst>
+            <a:rect l="l" t="t" r="r" b="b"/>
+            <a:pathLst>
+              <a:path w="1283855" h="387927">
+                <a:moveTo>
+                  <a:pt x="1283855" y="387927"/>
+                </a:moveTo>
+                <a:lnTo>
+                  <a:pt x="923637" y="387927"/>
+                </a:lnTo>
+                <a:lnTo>
+                  <a:pt x="923637" y="0"/>
+                </a:lnTo>
+                <a:lnTo>
+                  <a:pt x="0" y="0"/>
+                </a:lnTo>
+              </a:path>
+            </a:pathLst>
+          </a:custGeom>
+          <a:noFill/>
+          <a:ln w="76200">
+            <a:solidFill>
+              <a:schemeClr val="accent4"/>
+            </a:solidFill>
+          </a:ln>
+        </p:spPr>
+        <p:style>
+          <a:lnRef idx="2">
+            <a:schemeClr val="accent1">
+              <a:shade val="50000"/>
+            </a:schemeClr>
+          </a:lnRef>
+          <a:fillRef idx="1">
+            <a:schemeClr val="accent1"/>
+          </a:fillRef>
+          <a:effectRef idx="0">
+            <a:schemeClr val="accent1"/>
+          </a:effectRef>
+          <a:fontRef idx="minor">
+            <a:schemeClr val="lt1"/>
+          </a:fontRef>
+        </p:style>
+        <p:txBody>
+          <a:bodyPr rtlCol="0" anchor="ctr"/>
+          <a:lstStyle/>
+          <a:p>
+            <a:pPr algn="ctr"/>
+            <a:endParaRPr lang="en-BE"/>
+          </a:p>
+        </p:txBody>
+      </p:sp>
+      <p:sp>
+        <p:nvSpPr>
+          <p:cNvPr id="21" name="Freeform 20">
+            <a:extLst>
+              <a:ext uri="{FF2B5EF4-FFF2-40B4-BE49-F238E27FC236}">
+                <a16:creationId xmlns:a16="http://schemas.microsoft.com/office/drawing/2014/main" id="{CE735388-A005-2CB8-B0A1-3C7DA8E80390}"/>
+              </a:ext>
+            </a:extLst>
+          </p:cNvPr>
+          <p:cNvSpPr/>
+          <p:nvPr/>
+        </p:nvSpPr>
+        <p:spPr>
+          <a:xfrm>
+            <a:off x="3066474" y="651158"/>
+            <a:ext cx="4433454" cy="1265382"/>
+          </a:xfrm>
+          <a:custGeom>
+            <a:avLst/>
+            <a:gdLst>
+              <a:gd name="connsiteX0" fmla="*/ 4082472 w 4433454"/>
+              <a:gd name="connsiteY0" fmla="*/ 1265382 h 1265382"/>
+              <a:gd name="connsiteX1" fmla="*/ 4433454 w 4433454"/>
+              <a:gd name="connsiteY1" fmla="*/ 1265382 h 1265382"/>
+              <a:gd name="connsiteX2" fmla="*/ 4433454 w 4433454"/>
+              <a:gd name="connsiteY2" fmla="*/ 0 h 1265382"/>
+              <a:gd name="connsiteX3" fmla="*/ 4322618 w 4433454"/>
+              <a:gd name="connsiteY3" fmla="*/ 0 h 1265382"/>
+              <a:gd name="connsiteX4" fmla="*/ 1062182 w 4433454"/>
+              <a:gd name="connsiteY4" fmla="*/ 0 h 1265382"/>
+              <a:gd name="connsiteX5" fmla="*/ 1062182 w 4433454"/>
+              <a:gd name="connsiteY5" fmla="*/ 581891 h 1265382"/>
+              <a:gd name="connsiteX6" fmla="*/ 0 w 4433454"/>
+              <a:gd name="connsiteY6" fmla="*/ 581891 h 1265382"/>
+            </a:gdLst>
+            <a:ahLst/>
+            <a:cxnLst>
+              <a:cxn ang="0">
+                <a:pos x="connsiteX0" y="connsiteY0"/>
+              </a:cxn>
+              <a:cxn ang="0">
+                <a:pos x="connsiteX1" y="connsiteY1"/>
+              </a:cxn>
+              <a:cxn ang="0">
+                <a:pos x="connsiteX2" y="connsiteY2"/>
+              </a:cxn>
+              <a:cxn ang="0">
+                <a:pos x="connsiteX3" y="connsiteY3"/>
+              </a:cxn>
+              <a:cxn ang="0">
+                <a:pos x="connsiteX4" y="connsiteY4"/>
+              </a:cxn>
+              <a:cxn ang="0">
+                <a:pos x="connsiteX5" y="connsiteY5"/>
+              </a:cxn>
+              <a:cxn ang="0">
+                <a:pos x="connsiteX6" y="connsiteY6"/>
+              </a:cxn>
+            </a:cxnLst>
+            <a:rect l="l" t="t" r="r" b="b"/>
+            <a:pathLst>
+              <a:path w="4433454" h="1265382">
+                <a:moveTo>
+                  <a:pt x="4082472" y="1265382"/>
+                </a:moveTo>
+                <a:lnTo>
+                  <a:pt x="4433454" y="1265382"/>
+                </a:lnTo>
+                <a:lnTo>
+                  <a:pt x="4433454" y="0"/>
+                </a:lnTo>
+                <a:lnTo>
+                  <a:pt x="4322618" y="0"/>
+                </a:lnTo>
+                <a:lnTo>
+                  <a:pt x="1062182" y="0"/>
+                </a:lnTo>
+                <a:lnTo>
+                  <a:pt x="1062182" y="581891"/>
+                </a:lnTo>
+                <a:lnTo>
+                  <a:pt x="0" y="581891"/>
+                </a:lnTo>
+              </a:path>
+            </a:pathLst>
+          </a:custGeom>
+          <a:noFill/>
+          <a:ln w="76200">
+            <a:solidFill>
+              <a:schemeClr val="tx1"/>
+            </a:solidFill>
+          </a:ln>
+        </p:spPr>
+        <p:style>
+          <a:lnRef idx="2">
+            <a:schemeClr val="accent1">
+              <a:shade val="50000"/>
+            </a:schemeClr>
+          </a:lnRef>
+          <a:fillRef idx="1">
+            <a:schemeClr val="accent1"/>
+          </a:fillRef>
+          <a:effectRef idx="0">
+            <a:schemeClr val="accent1"/>
+          </a:effectRef>
+          <a:fontRef idx="minor">
+            <a:schemeClr val="lt1"/>
+          </a:fontRef>
+        </p:style>
+        <p:txBody>
+          <a:bodyPr rtlCol="0" anchor="ctr"/>
+          <a:lstStyle/>
+          <a:p>
+            <a:pPr algn="ctr"/>
+            <a:endParaRPr lang="en-BE"/>
+          </a:p>
+        </p:txBody>
+      </p:sp>
+      <p:sp>
+        <p:nvSpPr>
+          <p:cNvPr id="22" name="Freeform 21">
+            <a:extLst>
+              <a:ext uri="{FF2B5EF4-FFF2-40B4-BE49-F238E27FC236}">
+                <a16:creationId xmlns:a16="http://schemas.microsoft.com/office/drawing/2014/main" id="{D6FA0B9F-442A-92F7-1BE9-08772C2E0F7F}"/>
+              </a:ext>
+            </a:extLst>
+          </p:cNvPr>
+          <p:cNvSpPr/>
+          <p:nvPr/>
+        </p:nvSpPr>
+        <p:spPr>
+          <a:xfrm>
+            <a:off x="3048001" y="484904"/>
+            <a:ext cx="4618182" cy="1662545"/>
+          </a:xfrm>
+          <a:custGeom>
+            <a:avLst/>
+            <a:gdLst>
+              <a:gd name="connsiteX0" fmla="*/ 4091709 w 4618182"/>
+              <a:gd name="connsiteY0" fmla="*/ 1662545 h 1662545"/>
+              <a:gd name="connsiteX1" fmla="*/ 4618182 w 4618182"/>
+              <a:gd name="connsiteY1" fmla="*/ 1662545 h 1662545"/>
+              <a:gd name="connsiteX2" fmla="*/ 4618182 w 4618182"/>
+              <a:gd name="connsiteY2" fmla="*/ 1560945 h 1662545"/>
+              <a:gd name="connsiteX3" fmla="*/ 4618182 w 4618182"/>
+              <a:gd name="connsiteY3" fmla="*/ 0 h 1662545"/>
+              <a:gd name="connsiteX4" fmla="*/ 905164 w 4618182"/>
+              <a:gd name="connsiteY4" fmla="*/ 0 h 1662545"/>
+              <a:gd name="connsiteX5" fmla="*/ 905164 w 4618182"/>
+              <a:gd name="connsiteY5" fmla="*/ 443345 h 1662545"/>
+              <a:gd name="connsiteX6" fmla="*/ 0 w 4618182"/>
+              <a:gd name="connsiteY6" fmla="*/ 443345 h 1662545"/>
+            </a:gdLst>
+            <a:ahLst/>
+            <a:cxnLst>
+              <a:cxn ang="0">
+                <a:pos x="connsiteX0" y="connsiteY0"/>
+              </a:cxn>
+              <a:cxn ang="0">
+                <a:pos x="connsiteX1" y="connsiteY1"/>
+              </a:cxn>
+              <a:cxn ang="0">
+                <a:pos x="connsiteX2" y="connsiteY2"/>
+              </a:cxn>
+              <a:cxn ang="0">
+                <a:pos x="connsiteX3" y="connsiteY3"/>
+              </a:cxn>
+              <a:cxn ang="0">
+                <a:pos x="connsiteX4" y="connsiteY4"/>
+              </a:cxn>
+              <a:cxn ang="0">
+                <a:pos x="connsiteX5" y="connsiteY5"/>
+              </a:cxn>
+              <a:cxn ang="0">
+                <a:pos x="connsiteX6" y="connsiteY6"/>
+              </a:cxn>
+            </a:cxnLst>
+            <a:rect l="l" t="t" r="r" b="b"/>
+            <a:pathLst>
+              <a:path w="4618182" h="1662545">
+                <a:moveTo>
+                  <a:pt x="4091709" y="1662545"/>
+                </a:moveTo>
+                <a:lnTo>
+                  <a:pt x="4618182" y="1662545"/>
+                </a:lnTo>
+                <a:lnTo>
+                  <a:pt x="4618182" y="1560945"/>
+                </a:lnTo>
+                <a:lnTo>
+                  <a:pt x="4618182" y="0"/>
+                </a:lnTo>
+                <a:lnTo>
+                  <a:pt x="905164" y="0"/>
+                </a:lnTo>
+                <a:lnTo>
+                  <a:pt x="905164" y="443345"/>
+                </a:lnTo>
+                <a:lnTo>
+                  <a:pt x="0" y="443345"/>
+                </a:lnTo>
+              </a:path>
+            </a:pathLst>
+          </a:custGeom>
+          <a:noFill/>
+          <a:ln w="76200">
+            <a:solidFill>
+              <a:srgbClr val="FF0000"/>
+            </a:solidFill>
+          </a:ln>
+        </p:spPr>
+        <p:style>
+          <a:lnRef idx="2">
+            <a:schemeClr val="accent1">
+              <a:shade val="50000"/>
+            </a:schemeClr>
+          </a:lnRef>
+          <a:fillRef idx="1">
+            <a:schemeClr val="accent1"/>
+          </a:fillRef>
+          <a:effectRef idx="0">
+            <a:schemeClr val="accent1"/>
+          </a:effectRef>
+          <a:fontRef idx="minor">
+            <a:schemeClr val="lt1"/>
+          </a:fontRef>
+        </p:style>
+        <p:txBody>
+          <a:bodyPr rtlCol="0" anchor="ctr"/>
+          <a:lstStyle/>
+          <a:p>
+            <a:pPr algn="ctr"/>
+            <a:endParaRPr lang="en-BE"/>
+          </a:p>
+        </p:txBody>
+      </p:sp>
+      <p:pic>
+        <p:nvPicPr>
+          <p:cNvPr id="26" name="Picture 4">
+            <a:extLst>
+              <a:ext uri="{FF2B5EF4-FFF2-40B4-BE49-F238E27FC236}">
+                <a16:creationId xmlns:a16="http://schemas.microsoft.com/office/drawing/2014/main" id="{D66B5D46-AED7-020D-FA3D-28BB8494226F}"/>
+              </a:ext>
+            </a:extLst>
+          </p:cNvPr>
+          <p:cNvPicPr>
+            <a:picLocks noChangeAspect="1" noChangeArrowheads="1"/>
+          </p:cNvPicPr>
+          <p:nvPr/>
+        </p:nvPicPr>
+        <p:blipFill rotWithShape="1">
+          <a:blip r:embed="rId6">
+            <a:extLst>
+              <a:ext uri="{28A0092B-C50C-407E-A947-70E740481C1C}">
+                <a14:useLocalDpi xmlns:a14="http://schemas.microsoft.com/office/drawing/2010/main" val="0"/>
+              </a:ext>
+            </a:extLst>
+          </a:blip>
+          <a:srcRect t="64242" r="1683"/>
+          <a:stretch/>
+        </p:blipFill>
+        <p:spPr bwMode="auto">
+          <a:xfrm rot="5400000">
+            <a:off x="-2553855" y="2669306"/>
+            <a:ext cx="6742547" cy="1634836"/>
+          </a:xfrm>
+          <a:prstGeom prst="rect">
+            <a:avLst/>
+          </a:prstGeom>
+          <a:noFill/>
+          <a:extLst>
+            <a:ext uri="{909E8E84-426E-40DD-AFC4-6F175D3DCCD1}">
+              <a14:hiddenFill xmlns:a14="http://schemas.microsoft.com/office/drawing/2010/main">
+                <a:solidFill>
+                  <a:srgbClr val="FFFFFF"/>
+                </a:solidFill>
+              </a14:hiddenFill>
+            </a:ext>
+          </a:extLst>
+        </p:spPr>
+      </p:pic>
+      <p:sp>
+        <p:nvSpPr>
+          <p:cNvPr id="28" name="Rectangle 27">
+            <a:extLst>
+              <a:ext uri="{FF2B5EF4-FFF2-40B4-BE49-F238E27FC236}">
+                <a16:creationId xmlns:a16="http://schemas.microsoft.com/office/drawing/2014/main" id="{DB1E599A-7511-6165-0114-78910B9C790C}"/>
+              </a:ext>
+            </a:extLst>
+          </p:cNvPr>
+          <p:cNvSpPr/>
+          <p:nvPr/>
+        </p:nvSpPr>
+        <p:spPr>
+          <a:xfrm>
+            <a:off x="-1" y="59634"/>
+            <a:ext cx="1773384" cy="338554"/>
+          </a:xfrm>
+          <a:prstGeom prst="rect">
+            <a:avLst/>
+          </a:prstGeom>
+        </p:spPr>
+        <p:txBody>
+          <a:bodyPr wrap="square">
+            <a:spAutoFit/>
+          </a:bodyPr>
+          <a:lstStyle/>
+          <a:p>
+            <a:r>
+              <a:rPr lang="en-GB" sz="1600" b="1" dirty="0">
+                <a:solidFill>
+                  <a:schemeClr val="accent1"/>
+                </a:solidFill>
+                <a:latin typeface="Montserrat" pitchFamily="2" charset="77"/>
+              </a:rPr>
+              <a:t>Raspberry Pi</a:t>
+            </a:r>
+            <a:endParaRPr lang="en-BE" sz="1600" b="1" dirty="0">
+              <a:solidFill>
+                <a:schemeClr val="accent1"/>
+              </a:solidFill>
+              <a:latin typeface="Montserrat" pitchFamily="2" charset="77"/>
+            </a:endParaRPr>
+          </a:p>
+        </p:txBody>
+      </p:sp>
+      <p:sp>
+        <p:nvSpPr>
+          <p:cNvPr id="25" name="Freeform 24">
+            <a:extLst>
+              <a:ext uri="{FF2B5EF4-FFF2-40B4-BE49-F238E27FC236}">
+                <a16:creationId xmlns:a16="http://schemas.microsoft.com/office/drawing/2014/main" id="{30632034-1B16-07EB-0020-3379A5F73CAF}"/>
+              </a:ext>
+            </a:extLst>
+          </p:cNvPr>
+          <p:cNvSpPr/>
+          <p:nvPr/>
+        </p:nvSpPr>
+        <p:spPr>
+          <a:xfrm>
+            <a:off x="3084945" y="2475345"/>
+            <a:ext cx="1136073" cy="2863273"/>
+          </a:xfrm>
+          <a:custGeom>
+            <a:avLst/>
+            <a:gdLst>
+              <a:gd name="connsiteX0" fmla="*/ 1136073 w 1136073"/>
+              <a:gd name="connsiteY0" fmla="*/ 2863273 h 2863273"/>
+              <a:gd name="connsiteX1" fmla="*/ 166255 w 1136073"/>
+              <a:gd name="connsiteY1" fmla="*/ 2863273 h 2863273"/>
+              <a:gd name="connsiteX2" fmla="*/ 166255 w 1136073"/>
+              <a:gd name="connsiteY2" fmla="*/ 2743200 h 2863273"/>
+              <a:gd name="connsiteX3" fmla="*/ 166255 w 1136073"/>
+              <a:gd name="connsiteY3" fmla="*/ 0 h 2863273"/>
+              <a:gd name="connsiteX4" fmla="*/ 0 w 1136073"/>
+              <a:gd name="connsiteY4" fmla="*/ 0 h 2863273"/>
+            </a:gdLst>
+            <a:ahLst/>
+            <a:cxnLst>
+              <a:cxn ang="0">
+                <a:pos x="connsiteX0" y="connsiteY0"/>
+              </a:cxn>
+              <a:cxn ang="0">
+                <a:pos x="connsiteX1" y="connsiteY1"/>
+              </a:cxn>
+              <a:cxn ang="0">
+                <a:pos x="connsiteX2" y="connsiteY2"/>
+              </a:cxn>
+              <a:cxn ang="0">
+                <a:pos x="connsiteX3" y="connsiteY3"/>
+              </a:cxn>
+              <a:cxn ang="0">
+                <a:pos x="connsiteX4" y="connsiteY4"/>
+              </a:cxn>
+            </a:cxnLst>
+            <a:rect l="l" t="t" r="r" b="b"/>
+            <a:pathLst>
+              <a:path w="1136073" h="2863273">
+                <a:moveTo>
+                  <a:pt x="1136073" y="2863273"/>
+                </a:moveTo>
+                <a:lnTo>
+                  <a:pt x="166255" y="2863273"/>
+                </a:lnTo>
+                <a:lnTo>
+                  <a:pt x="166255" y="2743200"/>
+                </a:lnTo>
+                <a:lnTo>
+                  <a:pt x="166255" y="0"/>
+                </a:lnTo>
+                <a:lnTo>
+                  <a:pt x="0" y="0"/>
+                </a:lnTo>
+              </a:path>
+            </a:pathLst>
+          </a:custGeom>
+          <a:noFill/>
+          <a:ln w="76200">
+            <a:solidFill>
+              <a:schemeClr val="accent2">
+                <a:lumMod val="50000"/>
+              </a:schemeClr>
+            </a:solidFill>
+          </a:ln>
+        </p:spPr>
+        <p:style>
+          <a:lnRef idx="2">
+            <a:schemeClr val="accent1">
+              <a:shade val="50000"/>
+            </a:schemeClr>
+          </a:lnRef>
+          <a:fillRef idx="1">
+            <a:schemeClr val="accent1"/>
+          </a:fillRef>
+          <a:effectRef idx="0">
+            <a:schemeClr val="accent1"/>
+          </a:effectRef>
+          <a:fontRef idx="minor">
+            <a:schemeClr val="lt1"/>
+          </a:fontRef>
+        </p:style>
+        <p:txBody>
+          <a:bodyPr rtlCol="0" anchor="ctr"/>
+          <a:lstStyle/>
+          <a:p>
+            <a:pPr algn="ctr"/>
+            <a:endParaRPr lang="en-BE"/>
+          </a:p>
+        </p:txBody>
+      </p:sp>
+      <p:pic>
+        <p:nvPicPr>
+          <p:cNvPr id="1026" name="Picture 2" descr="How to Use SPS30: Pinouts, Specs, and Examples | Cirkit Designer">
+            <a:extLst>
+              <a:ext uri="{FF2B5EF4-FFF2-40B4-BE49-F238E27FC236}">
+                <a16:creationId xmlns:a16="http://schemas.microsoft.com/office/drawing/2014/main" id="{5C07CED5-DCCC-ADCA-A318-53C29829A4D6}"/>
+              </a:ext>
+            </a:extLst>
+          </p:cNvPr>
+          <p:cNvPicPr>
+            <a:picLocks noChangeAspect="1" noChangeArrowheads="1"/>
+          </p:cNvPicPr>
+          <p:nvPr/>
+        </p:nvPicPr>
+        <p:blipFill>
+          <a:blip r:embed="rId7">
+            <a:clrChange>
+              <a:clrFrom>
+                <a:srgbClr val="FFFFFF"/>
+              </a:clrFrom>
+              <a:clrTo>
+                <a:srgbClr val="FFFFFF">
+                  <a:alpha val="0"/>
+                </a:srgbClr>
+              </a:clrTo>
+            </a:clrChange>
+            <a:extLst>
+              <a:ext uri="{BEBA8EAE-BF5A-486C-A8C5-ECC9F3942E4B}">
+                <a14:imgProps xmlns:a14="http://schemas.microsoft.com/office/drawing/2010/main">
+                  <a14:imgLayer r:embed="rId8">
+                    <a14:imgEffect>
+                      <a14:backgroundRemoval t="10000" b="90000" l="10000" r="90000"/>
+                    </a14:imgEffect>
+                  </a14:imgLayer>
+                </a14:imgProps>
+              </a:ext>
+              <a:ext uri="{28A0092B-C50C-407E-A947-70E740481C1C}">
+                <a14:useLocalDpi xmlns:a14="http://schemas.microsoft.com/office/drawing/2010/main" val="0"/>
+              </a:ext>
+            </a:extLst>
+          </a:blip>
+          <a:srcRect/>
+          <a:stretch>
+            <a:fillRect/>
+          </a:stretch>
+        </p:blipFill>
+        <p:spPr bwMode="auto">
+          <a:xfrm rot="16200000">
+            <a:off x="7640430" y="2415594"/>
+            <a:ext cx="4035234" cy="4035234"/>
+          </a:xfrm>
+          <a:prstGeom prst="rect">
+            <a:avLst/>
+          </a:prstGeom>
+          <a:noFill/>
+          <a:extLst>
+            <a:ext uri="{909E8E84-426E-40DD-AFC4-6F175D3DCCD1}">
+              <a14:hiddenFill xmlns:a14="http://schemas.microsoft.com/office/drawing/2010/main">
+                <a:solidFill>
+                  <a:srgbClr val="FFFFFF"/>
+                </a:solidFill>
+              </a14:hiddenFill>
+            </a:ext>
+          </a:extLst>
+        </p:spPr>
+      </p:pic>
+      <p:sp>
+        <p:nvSpPr>
+          <p:cNvPr id="2" name="Rectangle 1">
+            <a:extLst>
+              <a:ext uri="{FF2B5EF4-FFF2-40B4-BE49-F238E27FC236}">
+                <a16:creationId xmlns:a16="http://schemas.microsoft.com/office/drawing/2014/main" id="{6242B106-D143-6A40-DAC7-DB1F7DF21FAF}"/>
+              </a:ext>
+            </a:extLst>
+          </p:cNvPr>
+          <p:cNvSpPr/>
+          <p:nvPr/>
+        </p:nvSpPr>
+        <p:spPr>
+          <a:xfrm>
+            <a:off x="9229084" y="2575805"/>
+            <a:ext cx="857927" cy="338554"/>
+          </a:xfrm>
+          <a:prstGeom prst="rect">
+            <a:avLst/>
+          </a:prstGeom>
+        </p:spPr>
+        <p:txBody>
+          <a:bodyPr wrap="none">
+            <a:spAutoFit/>
+          </a:bodyPr>
+          <a:lstStyle/>
+          <a:p>
+            <a:r>
+              <a:rPr lang="en-GB" sz="1600" b="1" dirty="0">
+                <a:solidFill>
+                  <a:schemeClr val="accent1"/>
+                </a:solidFill>
+                <a:latin typeface="Montserrat" pitchFamily="2" charset="77"/>
+              </a:rPr>
+              <a:t>SPS30</a:t>
+            </a:r>
+            <a:endParaRPr lang="en-BE" sz="1600" b="1" dirty="0">
+              <a:solidFill>
+                <a:schemeClr val="accent1"/>
+              </a:solidFill>
+              <a:latin typeface="Montserrat" pitchFamily="2" charset="77"/>
+            </a:endParaRPr>
+          </a:p>
+        </p:txBody>
+      </p:sp>
+      <p:sp>
+        <p:nvSpPr>
+          <p:cNvPr id="5" name="Rectangle 4">
+            <a:extLst>
+              <a:ext uri="{FF2B5EF4-FFF2-40B4-BE49-F238E27FC236}">
+                <a16:creationId xmlns:a16="http://schemas.microsoft.com/office/drawing/2014/main" id="{C820F7E2-14F4-E104-5ED8-5B6788746F4B}"/>
+              </a:ext>
+            </a:extLst>
+          </p:cNvPr>
+          <p:cNvSpPr/>
+          <p:nvPr/>
+        </p:nvSpPr>
+        <p:spPr>
+          <a:xfrm>
+            <a:off x="8086209" y="3684486"/>
+            <a:ext cx="785693" cy="214651"/>
+          </a:xfrm>
+          <a:prstGeom prst="rect">
+            <a:avLst/>
+          </a:prstGeom>
+          <a:noFill/>
+          <a:ln>
+            <a:noFill/>
+          </a:ln>
+        </p:spPr>
+        <p:style>
+          <a:lnRef idx="2">
+            <a:schemeClr val="accent1">
+              <a:shade val="15000"/>
+            </a:schemeClr>
+          </a:lnRef>
+          <a:fillRef idx="1">
+            <a:schemeClr val="accent1"/>
+          </a:fillRef>
+          <a:effectRef idx="0">
+            <a:schemeClr val="accent1"/>
+          </a:effectRef>
+          <a:fontRef idx="minor">
+            <a:schemeClr val="lt1"/>
+          </a:fontRef>
+        </p:style>
+        <p:txBody>
+          <a:bodyPr lIns="0" tIns="0" rIns="0" bIns="0" rtlCol="0" anchor="ctr"/>
+          <a:lstStyle/>
+          <a:p>
+            <a:pPr algn="ctr"/>
+            <a:r>
+              <a:rPr lang="en-US" sz="1200" b="1" dirty="0">
+                <a:solidFill>
+                  <a:sysClr val="windowText" lastClr="000000"/>
+                </a:solidFill>
+                <a:latin typeface="Courier New" panose="02070309020205020404" pitchFamily="49" charset="0"/>
+                <a:cs typeface="Courier New" panose="02070309020205020404" pitchFamily="49" charset="0"/>
+              </a:rPr>
+              <a:t>1 - VDD</a:t>
+            </a:r>
+          </a:p>
+        </p:txBody>
+      </p:sp>
+      <p:sp>
+        <p:nvSpPr>
+          <p:cNvPr id="6" name="Rectangle 5">
+            <a:extLst>
+              <a:ext uri="{FF2B5EF4-FFF2-40B4-BE49-F238E27FC236}">
+                <a16:creationId xmlns:a16="http://schemas.microsoft.com/office/drawing/2014/main" id="{84E62167-F28C-AFA8-6473-72E158265311}"/>
+              </a:ext>
+            </a:extLst>
+          </p:cNvPr>
+          <p:cNvSpPr/>
+          <p:nvPr/>
+        </p:nvSpPr>
+        <p:spPr>
+          <a:xfrm>
+            <a:off x="8086209" y="3519566"/>
+            <a:ext cx="785693" cy="214651"/>
+          </a:xfrm>
+          <a:prstGeom prst="rect">
+            <a:avLst/>
+          </a:prstGeom>
+          <a:noFill/>
+          <a:ln>
+            <a:noFill/>
+          </a:ln>
+        </p:spPr>
+        <p:style>
+          <a:lnRef idx="2">
+            <a:schemeClr val="accent1">
+              <a:shade val="15000"/>
+            </a:schemeClr>
+          </a:lnRef>
+          <a:fillRef idx="1">
+            <a:schemeClr val="accent1"/>
+          </a:fillRef>
+          <a:effectRef idx="0">
+            <a:schemeClr val="accent1"/>
+          </a:effectRef>
+          <a:fontRef idx="minor">
+            <a:schemeClr val="lt1"/>
+          </a:fontRef>
+        </p:style>
+        <p:txBody>
+          <a:bodyPr lIns="0" tIns="0" rIns="0" bIns="0" rtlCol="0" anchor="ctr"/>
+          <a:lstStyle/>
+          <a:p>
+            <a:pPr algn="ctr"/>
+            <a:r>
+              <a:rPr lang="en-US" sz="1200" b="1" dirty="0">
+                <a:solidFill>
+                  <a:sysClr val="windowText" lastClr="000000"/>
+                </a:solidFill>
+                <a:latin typeface="Courier New" panose="02070309020205020404" pitchFamily="49" charset="0"/>
+                <a:cs typeface="Courier New" panose="02070309020205020404" pitchFamily="49" charset="0"/>
+              </a:rPr>
+              <a:t>2 - SDA</a:t>
+            </a:r>
+          </a:p>
+        </p:txBody>
+      </p:sp>
+      <p:sp>
+        <p:nvSpPr>
+          <p:cNvPr id="8" name="Rectangle 7">
+            <a:extLst>
+              <a:ext uri="{FF2B5EF4-FFF2-40B4-BE49-F238E27FC236}">
+                <a16:creationId xmlns:a16="http://schemas.microsoft.com/office/drawing/2014/main" id="{8EF8C036-B404-7E02-1BE7-0B1605D42BD2}"/>
+              </a:ext>
+            </a:extLst>
+          </p:cNvPr>
+          <p:cNvSpPr/>
+          <p:nvPr/>
+        </p:nvSpPr>
+        <p:spPr>
+          <a:xfrm>
+            <a:off x="8086209" y="3354645"/>
+            <a:ext cx="785693" cy="214651"/>
+          </a:xfrm>
+          <a:prstGeom prst="rect">
+            <a:avLst/>
+          </a:prstGeom>
+          <a:noFill/>
+          <a:ln>
+            <a:noFill/>
+          </a:ln>
+        </p:spPr>
+        <p:style>
+          <a:lnRef idx="2">
+            <a:schemeClr val="accent1">
+              <a:shade val="15000"/>
+            </a:schemeClr>
+          </a:lnRef>
+          <a:fillRef idx="1">
+            <a:schemeClr val="accent1"/>
+          </a:fillRef>
+          <a:effectRef idx="0">
+            <a:schemeClr val="accent1"/>
+          </a:effectRef>
+          <a:fontRef idx="minor">
+            <a:schemeClr val="lt1"/>
+          </a:fontRef>
+        </p:style>
+        <p:txBody>
+          <a:bodyPr lIns="0" tIns="0" rIns="0" bIns="0" rtlCol="0" anchor="ctr"/>
+          <a:lstStyle/>
+          <a:p>
+            <a:pPr algn="ctr"/>
+            <a:r>
+              <a:rPr lang="en-US" sz="1200" b="1" dirty="0">
+                <a:solidFill>
+                  <a:sysClr val="windowText" lastClr="000000"/>
+                </a:solidFill>
+                <a:latin typeface="Courier New" panose="02070309020205020404" pitchFamily="49" charset="0"/>
+                <a:cs typeface="Courier New" panose="02070309020205020404" pitchFamily="49" charset="0"/>
+              </a:rPr>
+              <a:t>3 - SCL</a:t>
+            </a:r>
+          </a:p>
+        </p:txBody>
+      </p:sp>
+      <p:sp>
+        <p:nvSpPr>
+          <p:cNvPr id="9" name="Rectangle 8">
+            <a:extLst>
+              <a:ext uri="{FF2B5EF4-FFF2-40B4-BE49-F238E27FC236}">
+                <a16:creationId xmlns:a16="http://schemas.microsoft.com/office/drawing/2014/main" id="{E51A2779-2AA7-5A48-E14E-D72699DDAF98}"/>
+              </a:ext>
+            </a:extLst>
+          </p:cNvPr>
+          <p:cNvSpPr/>
+          <p:nvPr/>
+        </p:nvSpPr>
+        <p:spPr>
+          <a:xfrm>
+            <a:off x="8086209" y="3189724"/>
+            <a:ext cx="785693" cy="214651"/>
+          </a:xfrm>
+          <a:prstGeom prst="rect">
+            <a:avLst/>
+          </a:prstGeom>
+          <a:noFill/>
+          <a:ln>
+            <a:noFill/>
+          </a:ln>
+        </p:spPr>
+        <p:style>
+          <a:lnRef idx="2">
+            <a:schemeClr val="accent1">
+              <a:shade val="15000"/>
+            </a:schemeClr>
+          </a:lnRef>
+          <a:fillRef idx="1">
+            <a:schemeClr val="accent1"/>
+          </a:fillRef>
+          <a:effectRef idx="0">
+            <a:schemeClr val="accent1"/>
+          </a:effectRef>
+          <a:fontRef idx="minor">
+            <a:schemeClr val="lt1"/>
+          </a:fontRef>
+        </p:style>
+        <p:txBody>
+          <a:bodyPr lIns="0" tIns="0" rIns="0" bIns="0" rtlCol="0" anchor="ctr"/>
+          <a:lstStyle/>
+          <a:p>
+            <a:pPr algn="ctr"/>
+            <a:r>
+              <a:rPr lang="en-US" sz="1200" b="1" dirty="0">
+                <a:solidFill>
+                  <a:sysClr val="windowText" lastClr="000000"/>
+                </a:solidFill>
+                <a:latin typeface="Courier New" panose="02070309020205020404" pitchFamily="49" charset="0"/>
+                <a:cs typeface="Courier New" panose="02070309020205020404" pitchFamily="49" charset="0"/>
+              </a:rPr>
+              <a:t>4 - SEL</a:t>
+            </a:r>
+          </a:p>
+        </p:txBody>
+      </p:sp>
+      <p:sp>
+        <p:nvSpPr>
+          <p:cNvPr id="11" name="Rectangle 10">
+            <a:extLst>
+              <a:ext uri="{FF2B5EF4-FFF2-40B4-BE49-F238E27FC236}">
+                <a16:creationId xmlns:a16="http://schemas.microsoft.com/office/drawing/2014/main" id="{5284CEF1-43CA-8C4E-0D47-51F2946BC2CB}"/>
+              </a:ext>
+            </a:extLst>
+          </p:cNvPr>
+          <p:cNvSpPr/>
+          <p:nvPr/>
+        </p:nvSpPr>
+        <p:spPr>
+          <a:xfrm>
+            <a:off x="8086209" y="3024803"/>
+            <a:ext cx="785693" cy="214651"/>
+          </a:xfrm>
+          <a:prstGeom prst="rect">
+            <a:avLst/>
+          </a:prstGeom>
+          <a:noFill/>
+          <a:ln>
+            <a:noFill/>
+          </a:ln>
+        </p:spPr>
+        <p:style>
+          <a:lnRef idx="2">
+            <a:schemeClr val="accent1">
+              <a:shade val="15000"/>
+            </a:schemeClr>
+          </a:lnRef>
+          <a:fillRef idx="1">
+            <a:schemeClr val="accent1"/>
+          </a:fillRef>
+          <a:effectRef idx="0">
+            <a:schemeClr val="accent1"/>
+          </a:effectRef>
+          <a:fontRef idx="minor">
+            <a:schemeClr val="lt1"/>
+          </a:fontRef>
+        </p:style>
+        <p:txBody>
+          <a:bodyPr lIns="0" tIns="0" rIns="0" bIns="0" rtlCol="0" anchor="ctr"/>
+          <a:lstStyle/>
+          <a:p>
+            <a:pPr algn="ctr"/>
+            <a:r>
+              <a:rPr lang="en-US" sz="1200" b="1" dirty="0">
+                <a:solidFill>
+                  <a:sysClr val="windowText" lastClr="000000"/>
+                </a:solidFill>
+                <a:latin typeface="Courier New" panose="02070309020205020404" pitchFamily="49" charset="0"/>
+                <a:cs typeface="Courier New" panose="02070309020205020404" pitchFamily="49" charset="0"/>
+              </a:rPr>
+              <a:t>5 - GND</a:t>
+            </a:r>
+          </a:p>
+        </p:txBody>
+      </p:sp>
+      <p:cxnSp>
+        <p:nvCxnSpPr>
+          <p:cNvPr id="16" name="Straight Connector 15">
+            <a:extLst>
+              <a:ext uri="{FF2B5EF4-FFF2-40B4-BE49-F238E27FC236}">
+                <a16:creationId xmlns:a16="http://schemas.microsoft.com/office/drawing/2014/main" id="{D53AA8E1-EC0D-3889-3BC2-4EF38C9428A1}"/>
+              </a:ext>
+            </a:extLst>
+          </p:cNvPr>
+          <p:cNvCxnSpPr>
+            <a:cxnSpLocks/>
+          </p:cNvCxnSpPr>
+          <p:nvPr/>
+        </p:nvCxnSpPr>
+        <p:spPr>
+          <a:xfrm flipH="1" flipV="1">
+            <a:off x="2115128" y="3584854"/>
+            <a:ext cx="5971081" cy="32971"/>
+          </a:xfrm>
+          <a:prstGeom prst="line">
+            <a:avLst/>
+          </a:prstGeom>
+          <a:noFill/>
+          <a:ln w="76200">
+            <a:solidFill>
+              <a:srgbClr val="00B050"/>
+            </a:solidFill>
+          </a:ln>
+        </p:spPr>
+        <p:style>
+          <a:lnRef idx="2">
+            <a:schemeClr val="accent1">
+              <a:shade val="50000"/>
+            </a:schemeClr>
+          </a:lnRef>
+          <a:fillRef idx="1">
+            <a:schemeClr val="accent1"/>
+          </a:fillRef>
+          <a:effectRef idx="0">
+            <a:schemeClr val="accent1"/>
+          </a:effectRef>
+          <a:fontRef idx="minor">
+            <a:schemeClr val="lt1"/>
+          </a:fontRef>
+        </p:style>
+      </p:cxnSp>
+      <p:cxnSp>
+        <p:nvCxnSpPr>
+          <p:cNvPr id="17" name="Straight Connector 16">
+            <a:extLst>
+              <a:ext uri="{FF2B5EF4-FFF2-40B4-BE49-F238E27FC236}">
+                <a16:creationId xmlns:a16="http://schemas.microsoft.com/office/drawing/2014/main" id="{FE6356C4-1EF0-7F97-CABE-80D2FB95593E}"/>
+              </a:ext>
+            </a:extLst>
+          </p:cNvPr>
+          <p:cNvCxnSpPr>
+            <a:cxnSpLocks/>
+          </p:cNvCxnSpPr>
+          <p:nvPr/>
+        </p:nvCxnSpPr>
+        <p:spPr>
+          <a:xfrm flipH="1" flipV="1">
+            <a:off x="1967346" y="3431736"/>
+            <a:ext cx="6118862" cy="33787"/>
+          </a:xfrm>
+          <a:prstGeom prst="line">
+            <a:avLst/>
+          </a:prstGeom>
+          <a:noFill/>
+          <a:ln w="76200">
+            <a:solidFill>
+              <a:srgbClr val="00B0F0"/>
+            </a:solidFill>
+          </a:ln>
+        </p:spPr>
+        <p:style>
+          <a:lnRef idx="2">
+            <a:schemeClr val="accent1">
+              <a:shade val="50000"/>
+            </a:schemeClr>
+          </a:lnRef>
+          <a:fillRef idx="1">
+            <a:schemeClr val="accent1"/>
+          </a:fillRef>
+          <a:effectRef idx="0">
+            <a:schemeClr val="accent1"/>
+          </a:effectRef>
+          <a:fontRef idx="minor">
+            <a:schemeClr val="lt1"/>
+          </a:fontRef>
+        </p:style>
+      </p:cxnSp>
+      <p:cxnSp>
+        <p:nvCxnSpPr>
+          <p:cNvPr id="24" name="Straight Connector 23">
+            <a:extLst>
+              <a:ext uri="{FF2B5EF4-FFF2-40B4-BE49-F238E27FC236}">
+                <a16:creationId xmlns:a16="http://schemas.microsoft.com/office/drawing/2014/main" id="{EFA6A779-8DB9-6CA4-C1D2-4FA688FA8ADE}"/>
+              </a:ext>
+            </a:extLst>
+          </p:cNvPr>
+          <p:cNvCxnSpPr>
+            <a:cxnSpLocks/>
+          </p:cNvCxnSpPr>
+          <p:nvPr/>
+        </p:nvCxnSpPr>
+        <p:spPr>
+          <a:xfrm flipH="1" flipV="1">
+            <a:off x="2237625" y="3264297"/>
+            <a:ext cx="5848583" cy="32295"/>
+          </a:xfrm>
+          <a:prstGeom prst="line">
+            <a:avLst/>
+          </a:prstGeom>
+          <a:noFill/>
+          <a:ln w="76200">
+            <a:solidFill>
+              <a:schemeClr val="tx1"/>
+            </a:solidFill>
+          </a:ln>
+        </p:spPr>
+        <p:style>
+          <a:lnRef idx="2">
+            <a:schemeClr val="accent1">
+              <a:shade val="50000"/>
+            </a:schemeClr>
+          </a:lnRef>
+          <a:fillRef idx="1">
+            <a:schemeClr val="accent1"/>
+          </a:fillRef>
+          <a:effectRef idx="0">
+            <a:schemeClr val="accent1"/>
+          </a:effectRef>
+          <a:fontRef idx="minor">
+            <a:schemeClr val="lt1"/>
+          </a:fontRef>
+        </p:style>
+      </p:cxnSp>
+      <p:cxnSp>
+        <p:nvCxnSpPr>
+          <p:cNvPr id="30" name="Elbow Connector 29">
+            <a:extLst>
+              <a:ext uri="{FF2B5EF4-FFF2-40B4-BE49-F238E27FC236}">
+                <a16:creationId xmlns:a16="http://schemas.microsoft.com/office/drawing/2014/main" id="{9A86C0C0-EA82-F379-C5FF-8914918E31D8}"/>
+              </a:ext>
+            </a:extLst>
+          </p:cNvPr>
+          <p:cNvCxnSpPr>
+            <a:cxnSpLocks/>
+            <a:stCxn id="11" idx="1"/>
+          </p:cNvCxnSpPr>
+          <p:nvPr/>
+        </p:nvCxnSpPr>
+        <p:spPr>
+          <a:xfrm rot="10800000" flipV="1">
+            <a:off x="7640433" y="3132128"/>
+            <a:ext cx="445777" cy="167837"/>
+          </a:xfrm>
+          <a:prstGeom prst="bentConnector3">
+            <a:avLst>
+              <a:gd name="adj1" fmla="val 26557"/>
+            </a:avLst>
+          </a:prstGeom>
+          <a:noFill/>
+          <a:ln w="76200">
+            <a:solidFill>
+              <a:schemeClr val="tx1"/>
+            </a:solidFill>
+          </a:ln>
+        </p:spPr>
+        <p:style>
+          <a:lnRef idx="2">
+            <a:schemeClr val="accent1">
+              <a:shade val="50000"/>
+            </a:schemeClr>
+          </a:lnRef>
+          <a:fillRef idx="1">
+            <a:schemeClr val="accent1"/>
+          </a:fillRef>
+          <a:effectRef idx="0">
+            <a:schemeClr val="accent1"/>
+          </a:effectRef>
+          <a:fontRef idx="minor">
+            <a:schemeClr val="lt1"/>
+          </a:fontRef>
+        </p:style>
+      </p:cxnSp>
+      <p:sp>
+        <p:nvSpPr>
+          <p:cNvPr id="35" name="Freeform 34">
+            <a:extLst>
+              <a:ext uri="{FF2B5EF4-FFF2-40B4-BE49-F238E27FC236}">
+                <a16:creationId xmlns:a16="http://schemas.microsoft.com/office/drawing/2014/main" id="{41A396F2-6D9E-7CA4-2256-399170F26417}"/>
+              </a:ext>
+            </a:extLst>
+          </p:cNvPr>
+          <p:cNvSpPr/>
+          <p:nvPr/>
+        </p:nvSpPr>
+        <p:spPr>
+          <a:xfrm>
+            <a:off x="3074126" y="339634"/>
+            <a:ext cx="5016137" cy="3422469"/>
+          </a:xfrm>
+          <a:custGeom>
+            <a:avLst/>
+            <a:gdLst>
+              <a:gd name="connsiteX0" fmla="*/ 5016137 w 5016137"/>
+              <a:gd name="connsiteY0" fmla="*/ 3422469 h 3422469"/>
+              <a:gd name="connsiteX1" fmla="*/ 4781005 w 5016137"/>
+              <a:gd name="connsiteY1" fmla="*/ 3422469 h 3422469"/>
+              <a:gd name="connsiteX2" fmla="*/ 4781005 w 5016137"/>
+              <a:gd name="connsiteY2" fmla="*/ 0 h 3422469"/>
+              <a:gd name="connsiteX3" fmla="*/ 696685 w 5016137"/>
+              <a:gd name="connsiteY3" fmla="*/ 0 h 3422469"/>
+              <a:gd name="connsiteX4" fmla="*/ 696685 w 5016137"/>
+              <a:gd name="connsiteY4" fmla="*/ 113212 h 3422469"/>
+              <a:gd name="connsiteX5" fmla="*/ 696685 w 5016137"/>
+              <a:gd name="connsiteY5" fmla="*/ 278675 h 3422469"/>
+              <a:gd name="connsiteX6" fmla="*/ 0 w 5016137"/>
+              <a:gd name="connsiteY6" fmla="*/ 278675 h 3422469"/>
+              <a:gd name="connsiteX7" fmla="*/ 0 w 5016137"/>
+              <a:gd name="connsiteY7" fmla="*/ 261257 h 3422469"/>
+            </a:gdLst>
+            <a:ahLst/>
+            <a:cxnLst>
+              <a:cxn ang="0">
+                <a:pos x="connsiteX0" y="connsiteY0"/>
+              </a:cxn>
+              <a:cxn ang="0">
+                <a:pos x="connsiteX1" y="connsiteY1"/>
+              </a:cxn>
+              <a:cxn ang="0">
+                <a:pos x="connsiteX2" y="connsiteY2"/>
+              </a:cxn>
+              <a:cxn ang="0">
+                <a:pos x="connsiteX3" y="connsiteY3"/>
+              </a:cxn>
+              <a:cxn ang="0">
+                <a:pos x="connsiteX4" y="connsiteY4"/>
+              </a:cxn>
+              <a:cxn ang="0">
+                <a:pos x="connsiteX5" y="connsiteY5"/>
+              </a:cxn>
+              <a:cxn ang="0">
+                <a:pos x="connsiteX6" y="connsiteY6"/>
+              </a:cxn>
+              <a:cxn ang="0">
+                <a:pos x="connsiteX7" y="connsiteY7"/>
+              </a:cxn>
+            </a:cxnLst>
+            <a:rect l="l" t="t" r="r" b="b"/>
+            <a:pathLst>
+              <a:path w="5016137" h="3422469">
+                <a:moveTo>
+                  <a:pt x="5016137" y="3422469"/>
+                </a:moveTo>
+                <a:lnTo>
+                  <a:pt x="4781005" y="3422469"/>
+                </a:lnTo>
+                <a:lnTo>
+                  <a:pt x="4781005" y="0"/>
+                </a:lnTo>
+                <a:lnTo>
+                  <a:pt x="696685" y="0"/>
+                </a:lnTo>
+                <a:lnTo>
+                  <a:pt x="696685" y="113212"/>
+                </a:lnTo>
+                <a:lnTo>
+                  <a:pt x="696685" y="278675"/>
+                </a:lnTo>
+                <a:lnTo>
+                  <a:pt x="0" y="278675"/>
+                </a:lnTo>
+                <a:lnTo>
+                  <a:pt x="0" y="261257"/>
+                </a:lnTo>
+              </a:path>
+            </a:pathLst>
+          </a:custGeom>
+          <a:noFill/>
+          <a:ln w="76200">
+            <a:solidFill>
+              <a:srgbClr val="FF0000"/>
+            </a:solidFill>
+          </a:ln>
+        </p:spPr>
+        <p:style>
+          <a:lnRef idx="2">
+            <a:schemeClr val="accent1">
+              <a:shade val="50000"/>
+            </a:schemeClr>
+          </a:lnRef>
+          <a:fillRef idx="1">
+            <a:schemeClr val="accent1"/>
+          </a:fillRef>
+          <a:effectRef idx="0">
+            <a:schemeClr val="accent1"/>
+          </a:effectRef>
+          <a:fontRef idx="minor">
+            <a:schemeClr val="lt1"/>
+          </a:fontRef>
+        </p:style>
+        <p:txBody>
+          <a:bodyPr rtlCol="0" anchor="ctr"/>
+          <a:lstStyle/>
+          <a:p>
+            <a:pPr algn="ctr"/>
+            <a:endParaRPr lang="en-US"/>
+          </a:p>
+        </p:txBody>
+      </p:sp>
+    </p:spTree>
+    <p:extLst>
+      <p:ext uri="{BB962C8B-B14F-4D97-AF65-F5344CB8AC3E}">
+        <p14:creationId xmlns:p14="http://schemas.microsoft.com/office/powerpoint/2010/main" val="1627423532"/>
+      </p:ext>
+    </p:extLst>
+  </p:cSld>
+  <p:clrMapOvr>
+    <a:masterClrMapping/>
+  </p:clrMapOvr>
+</p:sld>
+</file>
+
 <file path=ppt/theme/theme1.xml><?xml version="1.0" encoding="utf-8"?>
 <a:theme xmlns:a="http://schemas.openxmlformats.org/drawingml/2006/main" name="Office Theme">
   <a:themeElements>

</xml_diff>